<commit_message>
AJP-Class-Chp01-Prog01 added and slides updated
</commit_message>
<xml_diff>
--- a/Slides/AJP - Unit 1 - Java Networking.pptx
+++ b/Slides/AJP - Unit 1 - Java Networking.pptx
@@ -183,7 +183,7 @@
   </p:defaultTextStyle>
   <p:extLst>
     <p:ext uri="{EFAFB233-063F-42B5-8137-9DF3F51BA10A}">
-      <p15:sldGuideLst xmlns="" xmlns:p15="http://schemas.microsoft.com/office/powerpoint/2012/main"/>
+      <p15:sldGuideLst xmlns:p15="http://schemas.microsoft.com/office/powerpoint/2012/main" xmlns=""/>
     </p:ext>
   </p:extLst>
 </p:presentation>
@@ -271,7 +271,7 @@
           <a:p>
             <a:fld id="{A1471088-6963-4E0E-A38A-0AE373C72001}" type="datetimeFigureOut">
               <a:rPr lang="en-IN" smtClean="0"/>
-              <a:t>04-07-2022</a:t>
+              <a:t>05-07-2022</a:t>
             </a:fld>
             <a:endParaRPr lang="en-IN"/>
           </a:p>
@@ -582,7 +582,7 @@
             <a:fld id="{FB6E4831-481F-4AF1-9D8E-170CD6E1C3F5}" type="datetimeFigureOut">
               <a:rPr lang="en-IN" smtClean="0"/>
               <a:pPr/>
-              <a:t>04-07-2022</a:t>
+              <a:t>05-07-2022</a:t>
             </a:fld>
             <a:endParaRPr lang="en-IN"/>
           </a:p>
@@ -757,7 +757,7 @@
             <a:fld id="{FB6E4831-481F-4AF1-9D8E-170CD6E1C3F5}" type="datetimeFigureOut">
               <a:rPr lang="en-IN" smtClean="0"/>
               <a:pPr/>
-              <a:t>04-07-2022</a:t>
+              <a:t>05-07-2022</a:t>
             </a:fld>
             <a:endParaRPr lang="en-IN"/>
           </a:p>
@@ -942,7 +942,7 @@
             <a:fld id="{FB6E4831-481F-4AF1-9D8E-170CD6E1C3F5}" type="datetimeFigureOut">
               <a:rPr lang="en-IN" smtClean="0"/>
               <a:pPr/>
-              <a:t>04-07-2022</a:t>
+              <a:t>05-07-2022</a:t>
             </a:fld>
             <a:endParaRPr lang="en-IN"/>
           </a:p>
@@ -1114,7 +1114,7 @@
             <a:fld id="{FB6E4831-481F-4AF1-9D8E-170CD6E1C3F5}" type="datetimeFigureOut">
               <a:rPr lang="en-IN" smtClean="0"/>
               <a:pPr/>
-              <a:t>04-07-2022</a:t>
+              <a:t>05-07-2022</a:t>
             </a:fld>
             <a:endParaRPr lang="en-IN"/>
           </a:p>
@@ -1371,7 +1371,7 @@
             <a:fld id="{FB6E4831-481F-4AF1-9D8E-170CD6E1C3F5}" type="datetimeFigureOut">
               <a:rPr lang="en-IN" smtClean="0"/>
               <a:pPr/>
-              <a:t>04-07-2022</a:t>
+              <a:t>05-07-2022</a:t>
             </a:fld>
             <a:endParaRPr lang="en-IN"/>
           </a:p>
@@ -1704,7 +1704,7 @@
             <a:fld id="{FB6E4831-481F-4AF1-9D8E-170CD6E1C3F5}" type="datetimeFigureOut">
               <a:rPr lang="en-IN" smtClean="0"/>
               <a:pPr/>
-              <a:t>04-07-2022</a:t>
+              <a:t>05-07-2022</a:t>
             </a:fld>
             <a:endParaRPr lang="en-IN"/>
           </a:p>
@@ -2185,7 +2185,7 @@
             <a:fld id="{FB6E4831-481F-4AF1-9D8E-170CD6E1C3F5}" type="datetimeFigureOut">
               <a:rPr lang="en-IN" smtClean="0"/>
               <a:pPr/>
-              <a:t>04-07-2022</a:t>
+              <a:t>05-07-2022</a:t>
             </a:fld>
             <a:endParaRPr lang="en-IN"/>
           </a:p>
@@ -2308,7 +2308,7 @@
             <a:fld id="{FB6E4831-481F-4AF1-9D8E-170CD6E1C3F5}" type="datetimeFigureOut">
               <a:rPr lang="en-IN" smtClean="0"/>
               <a:pPr/>
-              <a:t>04-07-2022</a:t>
+              <a:t>05-07-2022</a:t>
             </a:fld>
             <a:endParaRPr lang="en-IN"/>
           </a:p>
@@ -2408,7 +2408,7 @@
             <a:fld id="{FB6E4831-481F-4AF1-9D8E-170CD6E1C3F5}" type="datetimeFigureOut">
               <a:rPr lang="en-IN" smtClean="0"/>
               <a:pPr/>
-              <a:t>04-07-2022</a:t>
+              <a:t>05-07-2022</a:t>
             </a:fld>
             <a:endParaRPr lang="en-IN"/>
           </a:p>
@@ -2721,7 +2721,7 @@
             <a:fld id="{FB6E4831-481F-4AF1-9D8E-170CD6E1C3F5}" type="datetimeFigureOut">
               <a:rPr lang="en-IN" smtClean="0"/>
               <a:pPr/>
-              <a:t>04-07-2022</a:t>
+              <a:t>05-07-2022</a:t>
             </a:fld>
             <a:endParaRPr lang="en-IN"/>
           </a:p>
@@ -2999,7 +2999,7 @@
             <a:fld id="{FB6E4831-481F-4AF1-9D8E-170CD6E1C3F5}" type="datetimeFigureOut">
               <a:rPr lang="en-IN" smtClean="0"/>
               <a:pPr/>
-              <a:t>04-07-2022</a:t>
+              <a:t>05-07-2022</a:t>
             </a:fld>
             <a:endParaRPr lang="en-IN"/>
           </a:p>
@@ -3298,7 +3298,7 @@
             <a:fld id="{FB6E4831-481F-4AF1-9D8E-170CD6E1C3F5}" type="datetimeFigureOut">
               <a:rPr lang="en-IN" smtClean="0"/>
               <a:pPr/>
-              <a:t>04-07-2022</a:t>
+              <a:t>05-07-2022</a:t>
             </a:fld>
             <a:endParaRPr lang="en-IN"/>
           </a:p>
@@ -4961,6 +4961,13 @@
   <p:clrMapOvr>
     <a:masterClrMapping/>
   </p:clrMapOvr>
+  <p:timing>
+    <p:tnLst>
+      <p:par>
+        <p:cTn id="1" dur="indefinite" restart="never" nodeType="tmRoot"/>
+      </p:par>
+    </p:tnLst>
+  </p:timing>
 </p:sld>
 </file>
 
@@ -5077,6 +5084,13 @@
   <p:clrMapOvr>
     <a:masterClrMapping/>
   </p:clrMapOvr>
+  <p:timing>
+    <p:tnLst>
+      <p:par>
+        <p:cTn id="1" dur="indefinite" restart="never" nodeType="tmRoot"/>
+      </p:par>
+    </p:tnLst>
+  </p:timing>
 </p:sld>
 </file>
 
@@ -7272,6 +7286,13 @@
   <p:clrMapOvr>
     <a:masterClrMapping/>
   </p:clrMapOvr>
+  <p:timing>
+    <p:tnLst>
+      <p:par>
+        <p:cTn id="1" dur="indefinite" restart="never" nodeType="tmRoot"/>
+      </p:par>
+    </p:tnLst>
+  </p:timing>
 </p:sld>
 </file>
 
@@ -7444,6 +7465,13 @@
   <p:clrMapOvr>
     <a:masterClrMapping/>
   </p:clrMapOvr>
+  <p:timing>
+    <p:tnLst>
+      <p:par>
+        <p:cTn id="1" dur="indefinite" restart="never" nodeType="tmRoot"/>
+      </p:par>
+    </p:tnLst>
+  </p:timing>
 </p:sld>
 </file>
 
@@ -7581,6 +7609,13 @@
   <p:clrMapOvr>
     <a:masterClrMapping/>
   </p:clrMapOvr>
+  <p:timing>
+    <p:tnLst>
+      <p:par>
+        <p:cTn id="1" dur="indefinite" restart="never" nodeType="tmRoot"/>
+      </p:par>
+    </p:tnLst>
+  </p:timing>
 </p:sld>
 </file>
 
@@ -8373,6 +8408,13 @@
   <p:clrMapOvr>
     <a:masterClrMapping/>
   </p:clrMapOvr>
+  <p:timing>
+    <p:tnLst>
+      <p:par>
+        <p:cTn id="1" dur="indefinite" restart="never" nodeType="tmRoot"/>
+      </p:par>
+    </p:tnLst>
+  </p:timing>
 </p:sld>
 </file>
 
@@ -9601,6 +9643,13 @@
   <p:clrMapOvr>
     <a:masterClrMapping/>
   </p:clrMapOvr>
+  <p:timing>
+    <p:tnLst>
+      <p:par>
+        <p:cTn id="1" dur="indefinite" restart="never" nodeType="tmRoot"/>
+      </p:par>
+    </p:tnLst>
+  </p:timing>
 </p:sld>
 </file>
 
@@ -9697,6 +9746,13 @@
   <p:clrMapOvr>
     <a:masterClrMapping/>
   </p:clrMapOvr>
+  <p:timing>
+    <p:tnLst>
+      <p:par>
+        <p:cTn id="1" dur="indefinite" restart="never" nodeType="tmRoot"/>
+      </p:par>
+    </p:tnLst>
+  </p:timing>
 </p:sld>
 </file>
 
@@ -9842,6 +9898,13 @@
   <p:clrMapOvr>
     <a:masterClrMapping/>
   </p:clrMapOvr>
+  <p:timing>
+    <p:tnLst>
+      <p:par>
+        <p:cTn id="1" dur="indefinite" restart="never" nodeType="tmRoot"/>
+      </p:par>
+    </p:tnLst>
+  </p:timing>
 </p:sld>
 </file>
 
@@ -9935,6 +9998,13 @@
   <p:clrMapOvr>
     <a:masterClrMapping/>
   </p:clrMapOvr>
+  <p:timing>
+    <p:tnLst>
+      <p:par>
+        <p:cTn id="1" dur="indefinite" restart="never" nodeType="tmRoot"/>
+      </p:par>
+    </p:tnLst>
+  </p:timing>
 </p:sld>
 </file>
 
@@ -10071,6 +10141,13 @@
   <p:clrMapOvr>
     <a:masterClrMapping/>
   </p:clrMapOvr>
+  <p:timing>
+    <p:tnLst>
+      <p:par>
+        <p:cTn id="1" dur="indefinite" restart="never" nodeType="tmRoot"/>
+      </p:par>
+    </p:tnLst>
+  </p:timing>
 </p:sld>
 </file>
 
@@ -10252,6 +10329,13 @@
   <p:clrMapOvr>
     <a:masterClrMapping/>
   </p:clrMapOvr>
+  <p:timing>
+    <p:tnLst>
+      <p:par>
+        <p:cTn id="1" dur="indefinite" restart="never" nodeType="tmRoot"/>
+      </p:par>
+    </p:tnLst>
+  </p:timing>
 </p:sld>
 </file>
 
@@ -10415,6 +10499,13 @@
   <p:clrMapOvr>
     <a:masterClrMapping/>
   </p:clrMapOvr>
+  <p:timing>
+    <p:tnLst>
+      <p:par>
+        <p:cTn id="1" dur="indefinite" restart="never" nodeType="tmRoot"/>
+      </p:par>
+    </p:tnLst>
+  </p:timing>
 </p:sld>
 </file>
 
@@ -10516,6 +10607,13 @@
   <p:clrMapOvr>
     <a:masterClrMapping/>
   </p:clrMapOvr>
+  <p:timing>
+    <p:tnLst>
+      <p:par>
+        <p:cTn id="1" dur="indefinite" restart="never" nodeType="tmRoot"/>
+      </p:par>
+    </p:tnLst>
+  </p:timing>
 </p:sld>
 </file>
 
@@ -13257,7 +13355,7 @@
               <a:graphicData uri="http://schemas.openxmlformats.org/presentationml/2006/ole">
                 <mc:AlternateContent xmlns:mc="http://schemas.openxmlformats.org/markup-compatibility/2006">
                   <mc:Choice xmlns:v="urn:schemas-microsoft-com:vml" Requires="v">
-                    <p:oleObj spid="_x0000_s3162" name="Microsoft ClipArt Gallery" r:id="rId4" imgW="4006850" imgH="3192463" progId="MS_ClipArt_Gallery">
+                    <p:oleObj spid="_x0000_s3166" name="Microsoft ClipArt Gallery" r:id="rId4" imgW="4006850" imgH="3192463" progId="MS_ClipArt_Gallery">
                       <p:embed/>
                     </p:oleObj>
                   </mc:Choice>
@@ -13436,7 +13534,7 @@
               <a:graphicData uri="http://schemas.openxmlformats.org/presentationml/2006/ole">
                 <mc:AlternateContent xmlns:mc="http://schemas.openxmlformats.org/markup-compatibility/2006">
                   <mc:Choice xmlns:v="urn:schemas-microsoft-com:vml" Requires="v">
-                    <p:oleObj spid="_x0000_s3163" name="Microsoft ClipArt Gallery" r:id="rId6" imgW="4183063" imgH="3216275" progId="MS_ClipArt_Gallery">
+                    <p:oleObj spid="_x0000_s3167" name="Microsoft ClipArt Gallery" r:id="rId6" imgW="4183063" imgH="3216275" progId="MS_ClipArt_Gallery">
                       <p:embed/>
                     </p:oleObj>
                   </mc:Choice>
@@ -13599,6 +13697,13 @@
   <p:clrMapOvr>
     <a:masterClrMapping/>
   </p:clrMapOvr>
+  <p:timing>
+    <p:tnLst>
+      <p:par>
+        <p:cTn id="1" dur="indefinite" restart="never" nodeType="tmRoot"/>
+      </p:par>
+    </p:tnLst>
+  </p:timing>
 </p:sld>
 </file>
 
@@ -13718,6 +13823,13 @@
   <p:clrMapOvr>
     <a:masterClrMapping/>
   </p:clrMapOvr>
+  <p:timing>
+    <p:tnLst>
+      <p:par>
+        <p:cTn id="1" dur="indefinite" restart="never" nodeType="tmRoot"/>
+      </p:par>
+    </p:tnLst>
+  </p:timing>
 </p:sld>
 </file>
 
@@ -13941,6 +14053,13 @@
   <p:clrMapOvr>
     <a:masterClrMapping/>
   </p:clrMapOvr>
+  <p:timing>
+    <p:tnLst>
+      <p:par>
+        <p:cTn id="1" dur="indefinite" restart="never" nodeType="tmRoot"/>
+      </p:par>
+    </p:tnLst>
+  </p:timing>
 </p:sld>
 </file>
 
@@ -14133,6 +14252,13 @@
   <p:clrMapOvr>
     <a:masterClrMapping/>
   </p:clrMapOvr>
+  <p:timing>
+    <p:tnLst>
+      <p:par>
+        <p:cTn id="1" dur="indefinite" restart="never" nodeType="tmRoot"/>
+      </p:par>
+    </p:tnLst>
+  </p:timing>
 </p:sld>
 </file>
 
@@ -14312,6 +14438,13 @@
   <p:clrMapOvr>
     <a:masterClrMapping/>
   </p:clrMapOvr>
+  <p:timing>
+    <p:tnLst>
+      <p:par>
+        <p:cTn id="1" dur="indefinite" restart="never" nodeType="tmRoot"/>
+      </p:par>
+    </p:tnLst>
+  </p:timing>
 </p:sld>
 </file>
 
@@ -14360,7 +14493,7 @@
           <p:cNvPr id="10" name="Content Placeholder 9">
             <a:extLst>
               <a:ext uri="{FF2B5EF4-FFF2-40B4-BE49-F238E27FC236}">
-                <a16:creationId xmlns:a16="http://schemas.microsoft.com/office/drawing/2014/main" xmlns="" id="{0A22B6D8-9073-4E8C-972E-50F620F31FD1}"/>
+                <a16:creationId xmlns="" xmlns:a16="http://schemas.microsoft.com/office/drawing/2014/main" id="{0A22B6D8-9073-4E8C-972E-50F620F31FD1}"/>
               </a:ext>
             </a:extLst>
           </p:cNvPr>
@@ -14390,14 +14523,14 @@
                 <a:gridCol w="3947160">
                   <a:extLst>
                     <a:ext uri="{9D8B030D-6E8A-4147-A177-3AD203B41FA5}">
-                      <a16:colId xmlns:a16="http://schemas.microsoft.com/office/drawing/2014/main" xmlns="" val="4148119606"/>
+                      <a16:colId xmlns="" xmlns:a16="http://schemas.microsoft.com/office/drawing/2014/main" val="4148119606"/>
                     </a:ext>
                   </a:extLst>
                 </a:gridCol>
                 <a:gridCol w="3947160">
                   <a:extLst>
                     <a:ext uri="{9D8B030D-6E8A-4147-A177-3AD203B41FA5}">
-                      <a16:colId xmlns:a16="http://schemas.microsoft.com/office/drawing/2014/main" xmlns="" val="2229028685"/>
+                      <a16:colId xmlns="" xmlns:a16="http://schemas.microsoft.com/office/drawing/2014/main" val="2229028685"/>
                     </a:ext>
                   </a:extLst>
                 </a:gridCol>
@@ -14451,7 +14584,7 @@
                 </a:tc>
                 <a:extLst>
                   <a:ext uri="{0D108BD9-81ED-4DB2-BD59-A6C34878D82A}">
-                    <a16:rowId xmlns:a16="http://schemas.microsoft.com/office/drawing/2014/main" xmlns="" val="2494029403"/>
+                    <a16:rowId xmlns="" xmlns:a16="http://schemas.microsoft.com/office/drawing/2014/main" val="2494029403"/>
                   </a:ext>
                 </a:extLst>
               </a:tr>
@@ -14540,7 +14673,7 @@
                 </a:tc>
                 <a:extLst>
                   <a:ext uri="{0D108BD9-81ED-4DB2-BD59-A6C34878D82A}">
-                    <a16:rowId xmlns:a16="http://schemas.microsoft.com/office/drawing/2014/main" xmlns="" val="3295108235"/>
+                    <a16:rowId xmlns="" xmlns:a16="http://schemas.microsoft.com/office/drawing/2014/main" val="3295108235"/>
                   </a:ext>
                 </a:extLst>
               </a:tr>
@@ -14629,7 +14762,7 @@
                 </a:tc>
                 <a:extLst>
                   <a:ext uri="{0D108BD9-81ED-4DB2-BD59-A6C34878D82A}">
-                    <a16:rowId xmlns:a16="http://schemas.microsoft.com/office/drawing/2014/main" xmlns="" val="4188004682"/>
+                    <a16:rowId xmlns="" xmlns:a16="http://schemas.microsoft.com/office/drawing/2014/main" val="4188004682"/>
                   </a:ext>
                 </a:extLst>
               </a:tr>
@@ -14682,7 +14815,7 @@
                 </a:tc>
                 <a:extLst>
                   <a:ext uri="{0D108BD9-81ED-4DB2-BD59-A6C34878D82A}">
-                    <a16:rowId xmlns:a16="http://schemas.microsoft.com/office/drawing/2014/main" xmlns="" val="2535505752"/>
+                    <a16:rowId xmlns="" xmlns:a16="http://schemas.microsoft.com/office/drawing/2014/main" val="2535505752"/>
                   </a:ext>
                 </a:extLst>
               </a:tr>
@@ -14739,6 +14872,13 @@
   <p:clrMapOvr>
     <a:masterClrMapping/>
   </p:clrMapOvr>
+  <p:timing>
+    <p:tnLst>
+      <p:par>
+        <p:cTn id="1" dur="indefinite" restart="never" nodeType="tmRoot"/>
+      </p:par>
+    </p:tnLst>
+  </p:timing>
 </p:sld>
 </file>
 
@@ -14838,7 +14978,7 @@
           <p:cNvPr id="7" name="Content Placeholder 6">
             <a:extLst>
               <a:ext uri="{FF2B5EF4-FFF2-40B4-BE49-F238E27FC236}">
-                <a16:creationId xmlns:a16="http://schemas.microsoft.com/office/drawing/2014/main" xmlns="" id="{3A511582-0FFE-4E4B-8EF0-728CE85CB01F}"/>
+                <a16:creationId xmlns="" xmlns:a16="http://schemas.microsoft.com/office/drawing/2014/main" id="{3A511582-0FFE-4E4B-8EF0-728CE85CB01F}"/>
               </a:ext>
             </a:extLst>
           </p:cNvPr>
@@ -14868,14 +15008,14 @@
                 <a:gridCol w="4038600">
                   <a:extLst>
                     <a:ext uri="{9D8B030D-6E8A-4147-A177-3AD203B41FA5}">
-                      <a16:colId xmlns:a16="http://schemas.microsoft.com/office/drawing/2014/main" xmlns="" val="4094094059"/>
+                      <a16:colId xmlns="" xmlns:a16="http://schemas.microsoft.com/office/drawing/2014/main" val="4094094059"/>
                     </a:ext>
                   </a:extLst>
                 </a:gridCol>
                 <a:gridCol w="4038600">
                   <a:extLst>
                     <a:ext uri="{9D8B030D-6E8A-4147-A177-3AD203B41FA5}">
-                      <a16:colId xmlns:a16="http://schemas.microsoft.com/office/drawing/2014/main" xmlns="" val="162500616"/>
+                      <a16:colId xmlns="" xmlns:a16="http://schemas.microsoft.com/office/drawing/2014/main" val="162500616"/>
                     </a:ext>
                   </a:extLst>
                 </a:gridCol>
@@ -14929,7 +15069,7 @@
                 </a:tc>
                 <a:extLst>
                   <a:ext uri="{0D108BD9-81ED-4DB2-BD59-A6C34878D82A}">
-                    <a16:rowId xmlns:a16="http://schemas.microsoft.com/office/drawing/2014/main" xmlns="" val="3727081214"/>
+                    <a16:rowId xmlns="" xmlns:a16="http://schemas.microsoft.com/office/drawing/2014/main" val="3727081214"/>
                   </a:ext>
                 </a:extLst>
               </a:tr>
@@ -14982,7 +15122,7 @@
                 </a:tc>
                 <a:extLst>
                   <a:ext uri="{0D108BD9-81ED-4DB2-BD59-A6C34878D82A}">
-                    <a16:rowId xmlns:a16="http://schemas.microsoft.com/office/drawing/2014/main" xmlns="" val="836399312"/>
+                    <a16:rowId xmlns="" xmlns:a16="http://schemas.microsoft.com/office/drawing/2014/main" val="836399312"/>
                   </a:ext>
                 </a:extLst>
               </a:tr>
@@ -15035,7 +15175,7 @@
                 </a:tc>
                 <a:extLst>
                   <a:ext uri="{0D108BD9-81ED-4DB2-BD59-A6C34878D82A}">
-                    <a16:rowId xmlns:a16="http://schemas.microsoft.com/office/drawing/2014/main" xmlns="" val="1673196544"/>
+                    <a16:rowId xmlns="" xmlns:a16="http://schemas.microsoft.com/office/drawing/2014/main" val="1673196544"/>
                   </a:ext>
                 </a:extLst>
               </a:tr>
@@ -15056,6 +15196,13 @@
   <p:clrMapOvr>
     <a:masterClrMapping/>
   </p:clrMapOvr>
+  <p:timing>
+    <p:tnLst>
+      <p:par>
+        <p:cTn id="1" dur="indefinite" restart="never" nodeType="tmRoot"/>
+      </p:par>
+    </p:tnLst>
+  </p:timing>
 </p:sld>
 </file>
 
@@ -15445,6 +15592,13 @@
   <p:clrMapOvr>
     <a:masterClrMapping/>
   </p:clrMapOvr>
+  <p:timing>
+    <p:tnLst>
+      <p:par>
+        <p:cTn id="1" dur="indefinite" restart="never" nodeType="tmRoot"/>
+      </p:par>
+    </p:tnLst>
+  </p:timing>
 </p:sld>
 </file>
 
@@ -15900,6 +16054,13 @@
   <p:clrMapOvr>
     <a:masterClrMapping/>
   </p:clrMapOvr>
+  <p:timing>
+    <p:tnLst>
+      <p:par>
+        <p:cTn id="1" dur="indefinite" restart="never" nodeType="tmRoot"/>
+      </p:par>
+    </p:tnLst>
+  </p:timing>
 </p:sld>
 </file>
 
@@ -16347,6 +16508,13 @@
   <p:clrMapOvr>
     <a:masterClrMapping/>
   </p:clrMapOvr>
+  <p:timing>
+    <p:tnLst>
+      <p:par>
+        <p:cTn id="1" dur="indefinite" restart="never" nodeType="tmRoot"/>
+      </p:par>
+    </p:tnLst>
+  </p:timing>
 </p:sld>
 </file>
 
@@ -16433,6 +16601,13 @@
   <p:clrMapOvr>
     <a:masterClrMapping/>
   </p:clrMapOvr>
+  <p:timing>
+    <p:tnLst>
+      <p:par>
+        <p:cTn id="1" dur="indefinite" restart="never" nodeType="tmRoot"/>
+      </p:par>
+    </p:tnLst>
+  </p:timing>
 </p:sld>
 </file>
 
@@ -16809,6 +16984,13 @@
   <p:clrMapOvr>
     <a:masterClrMapping/>
   </p:clrMapOvr>
+  <p:timing>
+    <p:tnLst>
+      <p:par>
+        <p:cTn id="1" dur="indefinite" restart="never" nodeType="tmRoot"/>
+      </p:par>
+    </p:tnLst>
+  </p:timing>
 </p:sld>
 </file>
 
@@ -16983,6 +17165,13 @@
   <p:clrMapOvr>
     <a:masterClrMapping/>
   </p:clrMapOvr>
+  <p:timing>
+    <p:tnLst>
+      <p:par>
+        <p:cTn id="1" dur="indefinite" restart="never" nodeType="tmRoot"/>
+      </p:par>
+    </p:tnLst>
+  </p:timing>
 </p:sld>
 </file>
 
@@ -17620,6 +17809,13 @@
   <p:clrMapOvr>
     <a:masterClrMapping/>
   </p:clrMapOvr>
+  <p:timing>
+    <p:tnLst>
+      <p:par>
+        <p:cTn id="1" dur="indefinite" restart="never" nodeType="tmRoot"/>
+      </p:par>
+    </p:tnLst>
+  </p:timing>
 </p:sld>
 </file>
 
@@ -17808,6 +18004,13 @@
   <p:clrMapOvr>
     <a:masterClrMapping/>
   </p:clrMapOvr>
+  <p:timing>
+    <p:tnLst>
+      <p:par>
+        <p:cTn id="1" dur="indefinite" restart="never" nodeType="tmRoot"/>
+      </p:par>
+    </p:tnLst>
+  </p:timing>
 </p:sld>
 </file>
 
@@ -17920,6 +18123,13 @@
   <p:clrMapOvr>
     <a:masterClrMapping/>
   </p:clrMapOvr>
+  <p:timing>
+    <p:tnLst>
+      <p:par>
+        <p:cTn id="1" dur="indefinite" restart="never" nodeType="tmRoot"/>
+      </p:par>
+    </p:tnLst>
+  </p:timing>
 </p:sld>
 </file>
 
@@ -18009,6 +18219,13 @@
   <p:clrMapOvr>
     <a:masterClrMapping/>
   </p:clrMapOvr>
+  <p:timing>
+    <p:tnLst>
+      <p:par>
+        <p:cTn id="1" dur="indefinite" restart="never" nodeType="tmRoot"/>
+      </p:par>
+    </p:tnLst>
+  </p:timing>
 </p:sld>
 </file>
 
@@ -18034,7 +18251,7 @@
           <p:cNvPr id="2" name="Title 1">
             <a:extLst>
               <a:ext uri="{FF2B5EF4-FFF2-40B4-BE49-F238E27FC236}">
-                <a16:creationId xmlns:a16="http://schemas.microsoft.com/office/drawing/2014/main" xmlns="" id="{E6AF8411-4398-481F-8237-1FA6A6006CB0}"/>
+                <a16:creationId xmlns="" xmlns:a16="http://schemas.microsoft.com/office/drawing/2014/main" id="{E6AF8411-4398-481F-8237-1FA6A6006CB0}"/>
               </a:ext>
             </a:extLst>
           </p:cNvPr>
@@ -18068,7 +18285,7 @@
           <p:cNvPr id="4" name="Rectangle 3">
             <a:extLst>
               <a:ext uri="{FF2B5EF4-FFF2-40B4-BE49-F238E27FC236}">
-                <a16:creationId xmlns:a16="http://schemas.microsoft.com/office/drawing/2014/main" xmlns="" id="{46E5D5D9-5990-4083-96F8-7167991DDF96}"/>
+                <a16:creationId xmlns="" xmlns:a16="http://schemas.microsoft.com/office/drawing/2014/main" id="{46E5D5D9-5990-4083-96F8-7167991DDF96}"/>
               </a:ext>
             </a:extLst>
           </p:cNvPr>
@@ -18170,11 +18387,11 @@
               <a:t> </a:t>
             </a:r>
             <a:r>
-              <a:rPr lang="en-US" sz="2400" dirty="0" err="1"/>
-              <a:t>EchoDemoServer</a:t>
-            </a:r>
-            <a:r>
-              <a:rPr lang="en-US" sz="2400" dirty="0"/>
+              <a:rPr lang="en-US" sz="2400" dirty="0" err="1" smtClean="0"/>
+              <a:t>EchoServer</a:t>
+            </a:r>
+            <a:r>
+              <a:rPr lang="en-US" sz="2400" dirty="0" smtClean="0"/>
               <a:t> </a:t>
             </a:r>
             <a:r>
@@ -18655,7 +18872,7 @@
           <p:cNvPr id="5" name="Rectangle: Rounded Corners 4">
             <a:extLst>
               <a:ext uri="{FF2B5EF4-FFF2-40B4-BE49-F238E27FC236}">
-                <a16:creationId xmlns:a16="http://schemas.microsoft.com/office/drawing/2014/main" xmlns="" id="{26C8FC72-69A2-4A2B-BF11-365292130EB4}"/>
+                <a16:creationId xmlns="" xmlns:a16="http://schemas.microsoft.com/office/drawing/2014/main" id="{26C8FC72-69A2-4A2B-BF11-365292130EB4}"/>
               </a:ext>
             </a:extLst>
           </p:cNvPr>
@@ -18691,8 +18908,8 @@
           <a:p>
             <a:pPr algn="ctr"/>
             <a:r>
-              <a:rPr lang="en-US" sz="2000" b="1" dirty="0"/>
-              <a:t>EchoDemoServer.java</a:t>
+              <a:rPr lang="en-US" sz="2000" b="1" dirty="0" smtClean="0"/>
+              <a:t>EchoServer.java</a:t>
             </a:r>
             <a:endParaRPr lang="en-IN" sz="2000" b="1" dirty="0"/>
           </a:p>
@@ -18743,7 +18960,7 @@
           <p:cNvPr id="2" name="Title 1">
             <a:extLst>
               <a:ext uri="{FF2B5EF4-FFF2-40B4-BE49-F238E27FC236}">
-                <a16:creationId xmlns:a16="http://schemas.microsoft.com/office/drawing/2014/main" xmlns="" id="{44027335-884C-4B99-BFAB-9FE67CD77A07}"/>
+                <a16:creationId xmlns="" xmlns:a16="http://schemas.microsoft.com/office/drawing/2014/main" id="{44027335-884C-4B99-BFAB-9FE67CD77A07}"/>
               </a:ext>
             </a:extLst>
           </p:cNvPr>
@@ -18777,7 +18994,7 @@
           <p:cNvPr id="4" name="Rectangle 3">
             <a:extLst>
               <a:ext uri="{FF2B5EF4-FFF2-40B4-BE49-F238E27FC236}">
-                <a16:creationId xmlns:a16="http://schemas.microsoft.com/office/drawing/2014/main" xmlns="" id="{F239B26C-C8FD-4F8B-9AD9-B7E47E10C0BC}"/>
+                <a16:creationId xmlns="" xmlns:a16="http://schemas.microsoft.com/office/drawing/2014/main" id="{F239B26C-C8FD-4F8B-9AD9-B7E47E10C0BC}"/>
               </a:ext>
             </a:extLst>
           </p:cNvPr>
@@ -18875,11 +19092,11 @@
               <a:t> </a:t>
             </a:r>
             <a:r>
-              <a:rPr lang="en-IN" sz="2400" dirty="0" err="1">
-                <a:latin typeface="Courier New" pitchFamily="49" charset="0"/>
-                <a:cs typeface="Courier New" pitchFamily="49" charset="0"/>
-              </a:rPr>
-              <a:t>MyClientu</a:t>
+              <a:rPr lang="en-IN" sz="2400" dirty="0" err="1" smtClean="0">
+                <a:latin typeface="Courier New" pitchFamily="49" charset="0"/>
+                <a:cs typeface="Courier New" pitchFamily="49" charset="0"/>
+              </a:rPr>
+              <a:t>EchoClient</a:t>
             </a:r>
             <a:r>
               <a:rPr lang="en-IN" sz="2400" dirty="0">
@@ -19286,7 +19503,7 @@
           <p:cNvPr id="7" name="Rectangle: Rounded Corners 6">
             <a:extLst>
               <a:ext uri="{FF2B5EF4-FFF2-40B4-BE49-F238E27FC236}">
-                <a16:creationId xmlns:a16="http://schemas.microsoft.com/office/drawing/2014/main" xmlns="" id="{5CF51055-DF11-4C16-B202-2C98D02890D8}"/>
+                <a16:creationId xmlns="" xmlns:a16="http://schemas.microsoft.com/office/drawing/2014/main" id="{5CF51055-DF11-4C16-B202-2C98D02890D8}"/>
               </a:ext>
             </a:extLst>
           </p:cNvPr>
@@ -19322,8 +19539,8 @@
           <a:p>
             <a:pPr algn="ctr"/>
             <a:r>
-              <a:rPr lang="en-US" sz="2000" b="1" dirty="0"/>
-              <a:t>EchoDemoClient.java</a:t>
+              <a:rPr lang="en-US" sz="2000" b="1" dirty="0" smtClean="0"/>
+              <a:t>EchoClient.java</a:t>
             </a:r>
             <a:endParaRPr lang="en-IN" sz="2000" b="1" dirty="0"/>
           </a:p>
@@ -20088,6 +20305,13 @@
   <p:clrMapOvr>
     <a:masterClrMapping/>
   </p:clrMapOvr>
+  <p:timing>
+    <p:tnLst>
+      <p:par>
+        <p:cTn id="1" dur="indefinite" restart="never" nodeType="tmRoot"/>
+      </p:par>
+    </p:tnLst>
+  </p:timing>
 </p:sld>
 </file>
 
@@ -20196,6 +20420,13 @@
   <p:clrMapOvr>
     <a:masterClrMapping/>
   </p:clrMapOvr>
+  <p:timing>
+    <p:tnLst>
+      <p:par>
+        <p:cTn id="1" dur="indefinite" restart="never" nodeType="tmRoot"/>
+      </p:par>
+    </p:tnLst>
+  </p:timing>
 </p:sld>
 </file>
 
@@ -20407,7 +20638,7 @@
           <p:cNvPr id="4" name="Content Placeholder 3">
             <a:extLst>
               <a:ext uri="{FF2B5EF4-FFF2-40B4-BE49-F238E27FC236}">
-                <a16:creationId xmlns:a16="http://schemas.microsoft.com/office/drawing/2014/main" xmlns="" id="{0D3BE46D-D4B7-4773-A089-B318D590D2EC}"/>
+                <a16:creationId xmlns="" xmlns:a16="http://schemas.microsoft.com/office/drawing/2014/main" id="{0D3BE46D-D4B7-4773-A089-B318D590D2EC}"/>
               </a:ext>
             </a:extLst>
           </p:cNvPr>
@@ -20437,14 +20668,14 @@
                 <a:gridCol w="4107180">
                   <a:extLst>
                     <a:ext uri="{9D8B030D-6E8A-4147-A177-3AD203B41FA5}">
-                      <a16:colId xmlns:a16="http://schemas.microsoft.com/office/drawing/2014/main" xmlns="" val="4170491539"/>
+                      <a16:colId xmlns="" xmlns:a16="http://schemas.microsoft.com/office/drawing/2014/main" val="4170491539"/>
                     </a:ext>
                   </a:extLst>
                 </a:gridCol>
                 <a:gridCol w="4107180">
                   <a:extLst>
                     <a:ext uri="{9D8B030D-6E8A-4147-A177-3AD203B41FA5}">
-                      <a16:colId xmlns:a16="http://schemas.microsoft.com/office/drawing/2014/main" xmlns="" val="509871682"/>
+                      <a16:colId xmlns="" xmlns:a16="http://schemas.microsoft.com/office/drawing/2014/main" val="509871682"/>
                     </a:ext>
                   </a:extLst>
                 </a:gridCol>
@@ -20498,7 +20729,7 @@
                 </a:tc>
                 <a:extLst>
                   <a:ext uri="{0D108BD9-81ED-4DB2-BD59-A6C34878D82A}">
-                    <a16:rowId xmlns:a16="http://schemas.microsoft.com/office/drawing/2014/main" xmlns="" val="1470494853"/>
+                    <a16:rowId xmlns="" xmlns:a16="http://schemas.microsoft.com/office/drawing/2014/main" val="1470494853"/>
                   </a:ext>
                 </a:extLst>
               </a:tr>
@@ -20563,7 +20794,7 @@
                 </a:tc>
                 <a:extLst>
                   <a:ext uri="{0D108BD9-81ED-4DB2-BD59-A6C34878D82A}">
-                    <a16:rowId xmlns:a16="http://schemas.microsoft.com/office/drawing/2014/main" xmlns="" val="2639377761"/>
+                    <a16:rowId xmlns="" xmlns:a16="http://schemas.microsoft.com/office/drawing/2014/main" val="2639377761"/>
                   </a:ext>
                 </a:extLst>
               </a:tr>
@@ -20616,7 +20847,7 @@
                 </a:tc>
                 <a:extLst>
                   <a:ext uri="{0D108BD9-81ED-4DB2-BD59-A6C34878D82A}">
-                    <a16:rowId xmlns:a16="http://schemas.microsoft.com/office/drawing/2014/main" xmlns="" val="2613002052"/>
+                    <a16:rowId xmlns="" xmlns:a16="http://schemas.microsoft.com/office/drawing/2014/main" val="2613002052"/>
                   </a:ext>
                 </a:extLst>
               </a:tr>
@@ -20669,7 +20900,7 @@
                 </a:tc>
                 <a:extLst>
                   <a:ext uri="{0D108BD9-81ED-4DB2-BD59-A6C34878D82A}">
-                    <a16:rowId xmlns:a16="http://schemas.microsoft.com/office/drawing/2014/main" xmlns="" val="4086398249"/>
+                    <a16:rowId xmlns="" xmlns:a16="http://schemas.microsoft.com/office/drawing/2014/main" val="4086398249"/>
                   </a:ext>
                 </a:extLst>
               </a:tr>
@@ -20722,7 +20953,7 @@
                 </a:tc>
                 <a:extLst>
                   <a:ext uri="{0D108BD9-81ED-4DB2-BD59-A6C34878D82A}">
-                    <a16:rowId xmlns:a16="http://schemas.microsoft.com/office/drawing/2014/main" xmlns="" val="2813433476"/>
+                    <a16:rowId xmlns="" xmlns:a16="http://schemas.microsoft.com/office/drawing/2014/main" val="2813433476"/>
                   </a:ext>
                 </a:extLst>
               </a:tr>
@@ -20787,7 +21018,7 @@
                 </a:tc>
                 <a:extLst>
                   <a:ext uri="{0D108BD9-81ED-4DB2-BD59-A6C34878D82A}">
-                    <a16:rowId xmlns:a16="http://schemas.microsoft.com/office/drawing/2014/main" xmlns="" val="2154240040"/>
+                    <a16:rowId xmlns="" xmlns:a16="http://schemas.microsoft.com/office/drawing/2014/main" val="2154240040"/>
                   </a:ext>
                 </a:extLst>
               </a:tr>
@@ -20967,6 +21198,13 @@
   <p:clrMapOvr>
     <a:masterClrMapping/>
   </p:clrMapOvr>
+  <p:timing>
+    <p:tnLst>
+      <p:par>
+        <p:cTn id="1" dur="indefinite" restart="never" nodeType="tmRoot"/>
+      </p:par>
+    </p:tnLst>
+  </p:timing>
 </p:sld>
 </file>
 
@@ -20992,7 +21230,7 @@
           <p:cNvPr id="2" name="Title 1">
             <a:extLst>
               <a:ext uri="{FF2B5EF4-FFF2-40B4-BE49-F238E27FC236}">
-                <a16:creationId xmlns:a16="http://schemas.microsoft.com/office/drawing/2014/main" xmlns="" id="{1B80ABD8-37E8-47B1-89AC-8884239E35EA}"/>
+                <a16:creationId xmlns="" xmlns:a16="http://schemas.microsoft.com/office/drawing/2014/main" id="{1B80ABD8-37E8-47B1-89AC-8884239E35EA}"/>
               </a:ext>
             </a:extLst>
           </p:cNvPr>
@@ -21021,7 +21259,7 @@
           <p:cNvPr id="3" name="Content Placeholder 2">
             <a:extLst>
               <a:ext uri="{FF2B5EF4-FFF2-40B4-BE49-F238E27FC236}">
-                <a16:creationId xmlns:a16="http://schemas.microsoft.com/office/drawing/2014/main" xmlns="" id="{477D265A-8343-4C45-8DD2-C61D7837D62F}"/>
+                <a16:creationId xmlns="" xmlns:a16="http://schemas.microsoft.com/office/drawing/2014/main" id="{477D265A-8343-4C45-8DD2-C61D7837D62F}"/>
               </a:ext>
             </a:extLst>
           </p:cNvPr>
@@ -22260,7 +22498,7 @@
           <p:cNvPr id="2" name="Title 1">
             <a:extLst>
               <a:ext uri="{FF2B5EF4-FFF2-40B4-BE49-F238E27FC236}">
-                <a16:creationId xmlns:a16="http://schemas.microsoft.com/office/drawing/2014/main" xmlns="" id="{D33415B6-04DC-4E6C-BA81-A8BFF5E1E12B}"/>
+                <a16:creationId xmlns="" xmlns:a16="http://schemas.microsoft.com/office/drawing/2014/main" id="{D33415B6-04DC-4E6C-BA81-A8BFF5E1E12B}"/>
               </a:ext>
             </a:extLst>
           </p:cNvPr>
@@ -22303,7 +22541,7 @@
           <p:cNvPr id="3" name="Content Placeholder 2">
             <a:extLst>
               <a:ext uri="{FF2B5EF4-FFF2-40B4-BE49-F238E27FC236}">
-                <a16:creationId xmlns:a16="http://schemas.microsoft.com/office/drawing/2014/main" xmlns="" id="{7076138A-B6FA-4F83-95E8-D45135F4230D}"/>
+                <a16:creationId xmlns="" xmlns:a16="http://schemas.microsoft.com/office/drawing/2014/main" id="{7076138A-B6FA-4F83-95E8-D45135F4230D}"/>
               </a:ext>
             </a:extLst>
           </p:cNvPr>
@@ -24533,7 +24771,7 @@
           <a:graphicData uri="http://schemas.openxmlformats.org/presentationml/2006/ole">
             <mc:AlternateContent xmlns:mc="http://schemas.openxmlformats.org/markup-compatibility/2006">
               <mc:Choice xmlns:v="urn:schemas-microsoft-com:vml" Requires="v">
-                <p:oleObj spid="_x0000_s1284" name="Microsoft ClipArt Gallery" r:id="rId4" imgW="2559050" imgH="4298950" progId="MS_ClipArt_Gallery">
+                <p:oleObj spid="_x0000_s1296" name="Microsoft ClipArt Gallery" r:id="rId4" imgW="2559050" imgH="4298950" progId="MS_ClipArt_Gallery">
                   <p:embed/>
                 </p:oleObj>
               </mc:Choice>
@@ -24675,7 +24913,7 @@
           <a:graphicData uri="http://schemas.openxmlformats.org/presentationml/2006/ole">
             <mc:AlternateContent xmlns:mc="http://schemas.openxmlformats.org/markup-compatibility/2006">
               <mc:Choice xmlns:v="urn:schemas-microsoft-com:vml" Requires="v">
-                <p:oleObj spid="_x0000_s1285" name="Microsoft ClipArt Gallery" r:id="rId7" imgW="4183063" imgH="3216275" progId="MS_ClipArt_Gallery">
+                <p:oleObj spid="_x0000_s1297" name="Microsoft ClipArt Gallery" r:id="rId7" imgW="4183063" imgH="3216275" progId="MS_ClipArt_Gallery">
                   <p:embed/>
                 </p:oleObj>
               </mc:Choice>
@@ -24948,7 +25186,7 @@
           <a:graphicData uri="http://schemas.openxmlformats.org/presentationml/2006/ole">
             <mc:AlternateContent xmlns:mc="http://schemas.openxmlformats.org/markup-compatibility/2006">
               <mc:Choice xmlns:v="urn:schemas-microsoft-com:vml" Requires="v">
-                <p:oleObj spid="_x0000_s1286" name="Microsoft ClipArt Gallery" r:id="rId9" imgW="4183063" imgH="3216275" progId="MS_ClipArt_Gallery">
+                <p:oleObj spid="_x0000_s1298" name="Microsoft ClipArt Gallery" r:id="rId9" imgW="4183063" imgH="3216275" progId="MS_ClipArt_Gallery">
                   <p:embed/>
                 </p:oleObj>
               </mc:Choice>
@@ -25047,7 +25285,7 @@
           <a:graphicData uri="http://schemas.openxmlformats.org/presentationml/2006/ole">
             <mc:AlternateContent xmlns:mc="http://schemas.openxmlformats.org/markup-compatibility/2006">
               <mc:Choice xmlns:v="urn:schemas-microsoft-com:vml" Requires="v">
-                <p:oleObj spid="_x0000_s1287" name="Microsoft ClipArt Gallery" r:id="rId10" imgW="2559050" imgH="4298950" progId="MS_ClipArt_Gallery">
+                <p:oleObj spid="_x0000_s1299" name="Microsoft ClipArt Gallery" r:id="rId10" imgW="2559050" imgH="4298950" progId="MS_ClipArt_Gallery">
                   <p:embed/>
                 </p:oleObj>
               </mc:Choice>
@@ -25146,7 +25384,7 @@
           <a:graphicData uri="http://schemas.openxmlformats.org/presentationml/2006/ole">
             <mc:AlternateContent xmlns:mc="http://schemas.openxmlformats.org/markup-compatibility/2006">
               <mc:Choice xmlns:v="urn:schemas-microsoft-com:vml" Requires="v">
-                <p:oleObj spid="_x0000_s1288" name="Microsoft ClipArt Gallery" r:id="rId11" imgW="4548188" imgH="3284538" progId="MS_ClipArt_Gallery">
+                <p:oleObj spid="_x0000_s1300" name="Microsoft ClipArt Gallery" r:id="rId11" imgW="4548188" imgH="3284538" progId="MS_ClipArt_Gallery">
                   <p:embed/>
                 </p:oleObj>
               </mc:Choice>
@@ -25514,7 +25752,7 @@
           <a:graphicData uri="http://schemas.openxmlformats.org/presentationml/2006/ole">
             <mc:AlternateContent xmlns:mc="http://schemas.openxmlformats.org/markup-compatibility/2006">
               <mc:Choice xmlns:v="urn:schemas-microsoft-com:vml" Requires="v">
-                <p:oleObj spid="_x0000_s1289" name="CorelDRAW!" r:id="rId13" imgW="1255713" imgH="503238" progId="CDraw5">
+                <p:oleObj spid="_x0000_s1301" name="CorelDRAW!" r:id="rId13" imgW="1255713" imgH="503238" progId="CDraw5">
                   <p:embed/>
                 </p:oleObj>
               </mc:Choice>
@@ -30248,6 +30486,13 @@
   <p:clrMapOvr>
     <a:masterClrMapping/>
   </p:clrMapOvr>
+  <p:timing>
+    <p:tnLst>
+      <p:par>
+        <p:cTn id="1" dur="indefinite" restart="never" nodeType="tmRoot"/>
+      </p:par>
+    </p:tnLst>
+  </p:timing>
 </p:sld>
 </file>
 
@@ -33125,6 +33370,13 @@
   <p:clrMapOvr>
     <a:masterClrMapping/>
   </p:clrMapOvr>
+  <p:timing>
+    <p:tnLst>
+      <p:par>
+        <p:cTn id="1" dur="indefinite" restart="never" nodeType="tmRoot"/>
+      </p:par>
+    </p:tnLst>
+  </p:timing>
 </p:sld>
 </file>
 
@@ -34697,7 +34949,7 @@
           <a:graphicData uri="http://schemas.openxmlformats.org/presentationml/2006/ole">
             <mc:AlternateContent xmlns:mc="http://schemas.openxmlformats.org/markup-compatibility/2006">
               <mc:Choice xmlns:v="urn:schemas-microsoft-com:vml" Requires="v">
-                <p:oleObj spid="_x0000_s2136" name="Microsoft ClipArt Gallery" r:id="rId4" imgW="4183063" imgH="3216275" progId="MS_ClipArt_Gallery">
+                <p:oleObj spid="_x0000_s2140" name="Microsoft ClipArt Gallery" r:id="rId4" imgW="4183063" imgH="3216275" progId="MS_ClipArt_Gallery">
                   <p:embed/>
                 </p:oleObj>
               </mc:Choice>
@@ -34796,7 +35048,7 @@
           <a:graphicData uri="http://schemas.openxmlformats.org/presentationml/2006/ole">
             <mc:AlternateContent xmlns:mc="http://schemas.openxmlformats.org/markup-compatibility/2006">
               <mc:Choice xmlns:v="urn:schemas-microsoft-com:vml" Requires="v">
-                <p:oleObj spid="_x0000_s2137" name="Microsoft ClipArt Gallery" r:id="rId6" imgW="4006850" imgH="3192463" progId="MS_ClipArt_Gallery">
+                <p:oleObj spid="_x0000_s2141" name="Microsoft ClipArt Gallery" r:id="rId6" imgW="4006850" imgH="3192463" progId="MS_ClipArt_Gallery">
                   <p:embed/>
                 </p:oleObj>
               </mc:Choice>
@@ -35170,6 +35422,13 @@
   <p:clrMapOvr>
     <a:masterClrMapping/>
   </p:clrMapOvr>
+  <p:timing>
+    <p:tnLst>
+      <p:par>
+        <p:cTn id="1" dur="indefinite" restart="never" nodeType="tmRoot"/>
+      </p:par>
+    </p:tnLst>
+  </p:timing>
 </p:sld>
 </file>
 
@@ -35307,6 +35566,13 @@
   <p:clrMapOvr>
     <a:masterClrMapping/>
   </p:clrMapOvr>
+  <p:timing>
+    <p:tnLst>
+      <p:par>
+        <p:cTn id="1" dur="indefinite" restart="never" nodeType="tmRoot"/>
+      </p:par>
+    </p:tnLst>
+  </p:timing>
 </p:sld>
 </file>
 
@@ -36041,7 +36307,7 @@
   <a:extraClrSchemeLst/>
   <a:extLst>
     <a:ext uri="{05A4C25C-085E-4340-85A3-A5531E510DB2}">
-      <thm15:themeFamily xmlns="" xmlns:thm15="http://schemas.microsoft.com/office/thememl/2012/main" name="Frame" id="{F226E7A2-7162-461C-9490-D27D9DC04E43}" vid="{629A0216-3BBD-45C0-B63F-2683BEA18F60}"/>
+      <thm15:themeFamily xmlns:thm15="http://schemas.microsoft.com/office/thememl/2012/main" xmlns="" name="Frame" id="{F226E7A2-7162-461C-9490-D27D9DC04E43}" vid="{629A0216-3BBD-45C0-B63F-2683BEA18F60}"/>
     </a:ext>
   </a:extLst>
 </a:theme>

</xml_diff>